<commit_message>
fixed wrong link to docx version of cards
</commit_message>
<xml_diff>
--- a/docs/content/cards.pptx
+++ b/docs/content/cards.pptx
@@ -10682,7 +10682,13 @@
               <a:rPr lang="fr-FR" sz="700" dirty="0" smtClean="0">
                 <a:latin typeface="Stone Serif" pitchFamily="2" charset="0"/>
               </a:rPr>
-              <a:t>, Gilles Babinet</a:t>
+              <a:t>, Gilles </a:t>
+            </a:r>
+            <a:r>
+              <a:rPr lang="fr-FR" sz="700" dirty="0" smtClean="0">
+                <a:latin typeface="Stone Serif" pitchFamily="2" charset="0"/>
+              </a:rPr>
+              <a:t>Babinet</a:t>
             </a:r>
             <a:endParaRPr lang="fr-FR" sz="700" dirty="0">
               <a:latin typeface="Stone Serif" pitchFamily="2" charset="0"/>

</xml_diff>

<commit_message>
updated cards following exec training
</commit_message>
<xml_diff>
--- a/docs/content/cards.pptx
+++ b/docs/content/cards.pptx
@@ -209,7 +209,7 @@
           <a:p>
             <a:fld id="{D121557B-95DC-4F9D-80D7-494E711A263C}" type="datetimeFigureOut">
               <a:rPr lang="fr-FR" smtClean="0"/>
-              <a:t>12/01/2019</a:t>
+              <a:t>09/05/2019</a:t>
             </a:fld>
             <a:endParaRPr lang="fr-FR"/>
           </a:p>
@@ -375,7 +375,7 @@
           <a:p>
             <a:fld id="{34B0D5AD-2B20-4FC5-9805-AA792A2BEE79}" type="datetimeFigureOut">
               <a:rPr lang="fr-FR" smtClean="0"/>
-              <a:t>12/01/2019</a:t>
+              <a:t>09/05/2019</a:t>
             </a:fld>
             <a:endParaRPr lang="fr-FR"/>
           </a:p>
@@ -836,7 +836,7 @@
           <a:p>
             <a:fld id="{654FF092-CFE9-4329-97B3-D872B1066925}" type="datetimeFigureOut">
               <a:rPr lang="fr-FR" smtClean="0"/>
-              <a:t>12/01/2019</a:t>
+              <a:t>09/05/2019</a:t>
             </a:fld>
             <a:endParaRPr lang="fr-FR"/>
           </a:p>
@@ -1006,7 +1006,7 @@
           <a:p>
             <a:fld id="{654FF092-CFE9-4329-97B3-D872B1066925}" type="datetimeFigureOut">
               <a:rPr lang="fr-FR" smtClean="0"/>
-              <a:t>12/01/2019</a:t>
+              <a:t>09/05/2019</a:t>
             </a:fld>
             <a:endParaRPr lang="fr-FR"/>
           </a:p>
@@ -1186,7 +1186,7 @@
           <a:p>
             <a:fld id="{654FF092-CFE9-4329-97B3-D872B1066925}" type="datetimeFigureOut">
               <a:rPr lang="fr-FR" smtClean="0"/>
-              <a:t>12/01/2019</a:t>
+              <a:t>09/05/2019</a:t>
             </a:fld>
             <a:endParaRPr lang="fr-FR"/>
           </a:p>
@@ -1356,7 +1356,7 @@
           <a:p>
             <a:fld id="{654FF092-CFE9-4329-97B3-D872B1066925}" type="datetimeFigureOut">
               <a:rPr lang="fr-FR" smtClean="0"/>
-              <a:t>12/01/2019</a:t>
+              <a:t>09/05/2019</a:t>
             </a:fld>
             <a:endParaRPr lang="fr-FR"/>
           </a:p>
@@ -1600,7 +1600,7 @@
           <a:p>
             <a:fld id="{654FF092-CFE9-4329-97B3-D872B1066925}" type="datetimeFigureOut">
               <a:rPr lang="fr-FR" smtClean="0"/>
-              <a:t>12/01/2019</a:t>
+              <a:t>09/05/2019</a:t>
             </a:fld>
             <a:endParaRPr lang="fr-FR"/>
           </a:p>
@@ -1832,7 +1832,7 @@
           <a:p>
             <a:fld id="{654FF092-CFE9-4329-97B3-D872B1066925}" type="datetimeFigureOut">
               <a:rPr lang="fr-FR" smtClean="0"/>
-              <a:t>12/01/2019</a:t>
+              <a:t>09/05/2019</a:t>
             </a:fld>
             <a:endParaRPr lang="fr-FR"/>
           </a:p>
@@ -2199,7 +2199,7 @@
           <a:p>
             <a:fld id="{654FF092-CFE9-4329-97B3-D872B1066925}" type="datetimeFigureOut">
               <a:rPr lang="fr-FR" smtClean="0"/>
-              <a:t>12/01/2019</a:t>
+              <a:t>09/05/2019</a:t>
             </a:fld>
             <a:endParaRPr lang="fr-FR"/>
           </a:p>
@@ -2317,7 +2317,7 @@
           <a:p>
             <a:fld id="{654FF092-CFE9-4329-97B3-D872B1066925}" type="datetimeFigureOut">
               <a:rPr lang="fr-FR" smtClean="0"/>
-              <a:t>12/01/2019</a:t>
+              <a:t>09/05/2019</a:t>
             </a:fld>
             <a:endParaRPr lang="fr-FR"/>
           </a:p>
@@ -2412,7 +2412,7 @@
           <a:p>
             <a:fld id="{654FF092-CFE9-4329-97B3-D872B1066925}" type="datetimeFigureOut">
               <a:rPr lang="fr-FR" smtClean="0"/>
-              <a:t>12/01/2019</a:t>
+              <a:t>09/05/2019</a:t>
             </a:fld>
             <a:endParaRPr lang="fr-FR"/>
           </a:p>
@@ -2689,7 +2689,7 @@
           <a:p>
             <a:fld id="{654FF092-CFE9-4329-97B3-D872B1066925}" type="datetimeFigureOut">
               <a:rPr lang="fr-FR" smtClean="0"/>
-              <a:t>12/01/2019</a:t>
+              <a:t>09/05/2019</a:t>
             </a:fld>
             <a:endParaRPr lang="fr-FR"/>
           </a:p>
@@ -2946,7 +2946,7 @@
           <a:p>
             <a:fld id="{654FF092-CFE9-4329-97B3-D872B1066925}" type="datetimeFigureOut">
               <a:rPr lang="fr-FR" smtClean="0"/>
-              <a:t>12/01/2019</a:t>
+              <a:t>09/05/2019</a:t>
             </a:fld>
             <a:endParaRPr lang="fr-FR"/>
           </a:p>
@@ -3159,7 +3159,7 @@
           <a:p>
             <a:fld id="{654FF092-CFE9-4329-97B3-D872B1066925}" type="datetimeFigureOut">
               <a:rPr lang="fr-FR" smtClean="0"/>
-              <a:t>12/01/2019</a:t>
+              <a:t>09/05/2019</a:t>
             </a:fld>
             <a:endParaRPr lang="fr-FR"/>
           </a:p>
@@ -8935,7 +8935,7 @@
         <p:spPr>
           <a:xfrm>
             <a:off x="4083171" y="4110908"/>
-            <a:ext cx="1580437" cy="1155213"/>
+            <a:ext cx="1580437" cy="1184106"/>
           </a:xfrm>
           <a:prstGeom prst="rect">
             <a:avLst/>
@@ -9136,7 +9136,25 @@
               <a:rPr lang="fr-FR" sz="700" dirty="0" smtClean="0">
                 <a:latin typeface="Stone Serif" pitchFamily="2" charset="0"/>
               </a:rPr>
-              <a:t>- commencer par moderniser ses SI et ses ERP pour avoir de la donnée de qualité sur laquelle l’IA pourra s’exercer.</a:t>
+              <a:t>- commencer par moderniser ses SI et ses </a:t>
+            </a:r>
+            <a:r>
+              <a:rPr lang="fr-FR" sz="700" dirty="0" err="1" smtClean="0">
+                <a:latin typeface="Stone Serif" pitchFamily="2" charset="0"/>
+              </a:rPr>
+              <a:t>ERPs</a:t>
+            </a:r>
+            <a:r>
+              <a:rPr lang="fr-FR" sz="700" dirty="0" smtClean="0">
+                <a:latin typeface="Stone Serif" pitchFamily="2" charset="0"/>
+              </a:rPr>
+              <a:t> </a:t>
+            </a:r>
+            <a:r>
+              <a:rPr lang="fr-FR" sz="700" dirty="0" smtClean="0">
+                <a:latin typeface="Stone Serif" pitchFamily="2" charset="0"/>
+              </a:rPr>
+              <a:t>pour avoir de la donnée de qualité sur laquelle l’IA pourra s’exercer.</a:t>
             </a:r>
             <a:br>
               <a:rPr lang="fr-FR" sz="700" dirty="0" smtClean="0">
@@ -9147,8 +9165,29 @@
               <a:rPr lang="fr-FR" sz="700" dirty="0" smtClean="0">
                 <a:latin typeface="Stone Serif" pitchFamily="2" charset="0"/>
               </a:rPr>
-              <a:t>- procéder par tests et itérations.</a:t>
-            </a:r>
+              <a:t>- procéder par tests et </a:t>
+            </a:r>
+            <a:r>
+              <a:rPr lang="fr-FR" sz="700" dirty="0" smtClean="0">
+                <a:latin typeface="Stone Serif" pitchFamily="2" charset="0"/>
+              </a:rPr>
+              <a:t>itérations (créer des </a:t>
+            </a:r>
+            <a:r>
+              <a:rPr lang="fr-FR" sz="700" dirty="0" err="1" smtClean="0">
+                <a:latin typeface="Stone Serif" pitchFamily="2" charset="0"/>
+              </a:rPr>
+              <a:t>POCs</a:t>
+            </a:r>
+            <a:r>
+              <a:rPr lang="fr-FR" sz="700" dirty="0" smtClean="0">
+                <a:latin typeface="Stone Serif" pitchFamily="2" charset="0"/>
+              </a:rPr>
+              <a:t> avant de se lancer à grande échelle)</a:t>
+            </a:r>
+            <a:endParaRPr lang="fr-FR" sz="700" dirty="0" smtClean="0">
+              <a:latin typeface="Stone Serif" pitchFamily="2" charset="0"/>
+            </a:endParaRPr>
           </a:p>
         </p:txBody>
       </p:sp>
@@ -9380,16 +9419,22 @@
               <a:t>Datalyo</a:t>
             </a:r>
             <a:r>
-              <a:rPr lang="fr-FR" sz="800" dirty="0">
-                <a:latin typeface="Stone Serif" pitchFamily="2" charset="0"/>
-              </a:rPr>
-              <a:t> </a:t>
-            </a:r>
-            <a:r>
               <a:rPr lang="fr-FR" sz="800" dirty="0" smtClean="0">
                 <a:latin typeface="Stone Serif" pitchFamily="2" charset="0"/>
               </a:rPr>
-              <a:t>+ cabinets de consulting</a:t>
+              <a:t>, nabla.com, </a:t>
+            </a:r>
+            <a:r>
+              <a:rPr lang="fr-FR" sz="800" dirty="0" err="1" smtClean="0">
+                <a:latin typeface="Stone Serif" pitchFamily="2" charset="0"/>
+              </a:rPr>
+              <a:t>Sicara</a:t>
+            </a:r>
+            <a:r>
+              <a:rPr lang="fr-FR" sz="800" dirty="0" smtClean="0">
+                <a:latin typeface="Stone Serif" pitchFamily="2" charset="0"/>
+              </a:rPr>
+              <a:t> + cabinets</a:t>
             </a:r>
             <a:endParaRPr lang="fr-FR" sz="800" dirty="0">
               <a:latin typeface="Stone Serif" pitchFamily="2" charset="0"/>
@@ -9514,8 +9559,35 @@
               <a:rPr lang="fr-FR" sz="700" dirty="0" smtClean="0">
                 <a:latin typeface="Stone Serif" pitchFamily="2" charset="0"/>
               </a:rPr>
+              <a:t>). Optimisation logistique (entrepôts, </a:t>
+            </a:r>
+            <a:r>
+              <a:rPr lang="fr-FR" sz="700" dirty="0" err="1" smtClean="0">
+                <a:latin typeface="Stone Serif" pitchFamily="2" charset="0"/>
+              </a:rPr>
+              <a:t>supply</a:t>
+            </a:r>
+            <a:r>
+              <a:rPr lang="fr-FR" sz="700" dirty="0" smtClean="0">
+                <a:latin typeface="Stone Serif" pitchFamily="2" charset="0"/>
+              </a:rPr>
+              <a:t> </a:t>
+            </a:r>
+            <a:r>
+              <a:rPr lang="fr-FR" sz="700" dirty="0" err="1" smtClean="0">
+                <a:latin typeface="Stone Serif" pitchFamily="2" charset="0"/>
+              </a:rPr>
+              <a:t>chain</a:t>
+            </a:r>
+            <a:r>
+              <a:rPr lang="fr-FR" sz="700" dirty="0" smtClean="0">
+                <a:latin typeface="Stone Serif" pitchFamily="2" charset="0"/>
+              </a:rPr>
               <a:t>).</a:t>
             </a:r>
+            <a:endParaRPr lang="fr-FR" sz="700" dirty="0" smtClean="0">
+              <a:latin typeface="Stone Serif" pitchFamily="2" charset="0"/>
+            </a:endParaRPr>
           </a:p>
           <a:p>
             <a:pPr algn="just">
@@ -10350,7 +10422,19 @@
               <a:rPr lang="fr-FR" sz="800" dirty="0" smtClean="0">
                 <a:latin typeface="Stone Serif" pitchFamily="2" charset="0"/>
               </a:rPr>
-              <a:t>- des SI fiables</a:t>
+              <a:t>- des SI </a:t>
+            </a:r>
+            <a:r>
+              <a:rPr lang="fr-FR" sz="800" dirty="0" smtClean="0">
+                <a:latin typeface="Stone Serif" pitchFamily="2" charset="0"/>
+              </a:rPr>
+              <a:t>modernisés.</a:t>
+            </a:r>
+            <a:r>
+              <a:rPr lang="fr-FR" sz="800" dirty="0" smtClean="0">
+                <a:latin typeface="Stone Serif" pitchFamily="2" charset="0"/>
+              </a:rPr>
+              <a:t/>
             </a:r>
             <a:br>
               <a:rPr lang="fr-FR" sz="800" dirty="0" smtClean="0">
@@ -10361,7 +10445,7 @@
               <a:rPr lang="fr-FR" sz="800" dirty="0" smtClean="0">
                 <a:latin typeface="Stone Serif" pitchFamily="2" charset="0"/>
               </a:rPr>
-              <a:t>- une DSI modernisée</a:t>
+              <a:t>- une DSI orientée data</a:t>
             </a:r>
             <a:br>
               <a:rPr lang="fr-FR" sz="800" dirty="0" smtClean="0">
@@ -10437,8 +10521,8 @@
         </p:nvSpPr>
         <p:spPr>
           <a:xfrm>
-            <a:off x="2268542" y="2448378"/>
-            <a:ext cx="1573355" cy="613799"/>
+            <a:off x="2266716" y="2448378"/>
+            <a:ext cx="1575181" cy="613799"/>
           </a:xfrm>
           <a:prstGeom prst="rect">
             <a:avLst/>
@@ -10682,13 +10766,7 @@
               <a:rPr lang="fr-FR" sz="700" dirty="0" smtClean="0">
                 <a:latin typeface="Stone Serif" pitchFamily="2" charset="0"/>
               </a:rPr>
-              <a:t>, Gilles </a:t>
-            </a:r>
-            <a:r>
-              <a:rPr lang="fr-FR" sz="700" dirty="0" smtClean="0">
-                <a:latin typeface="Stone Serif" pitchFamily="2" charset="0"/>
-              </a:rPr>
-              <a:t>Babinet</a:t>
+              <a:t>, Gilles Babinet</a:t>
             </a:r>
             <a:endParaRPr lang="fr-FR" sz="700" dirty="0">
               <a:latin typeface="Stone Serif" pitchFamily="2" charset="0"/>
@@ -10704,8 +10782,8 @@
         </p:nvSpPr>
         <p:spPr>
           <a:xfrm>
-            <a:off x="2268546" y="2222055"/>
-            <a:ext cx="1573352" cy="279307"/>
+            <a:off x="2266716" y="2222055"/>
+            <a:ext cx="1575181" cy="279308"/>
           </a:xfrm>
           <a:prstGeom prst="rect">
             <a:avLst/>
@@ -13233,7 +13311,25 @@
               <a:rPr lang="fr-FR" sz="800" dirty="0" smtClean="0">
                 <a:latin typeface="Stone Serif" pitchFamily="2" charset="0"/>
               </a:rPr>
-              <a:t>- les frais de modernisation d’un SI, et de modernisation d’une DSI, peuvent être très élevés.</a:t>
+              <a:t>- les frais de modernisation d’un </a:t>
+            </a:r>
+            <a:r>
+              <a:rPr lang="fr-FR" sz="800" dirty="0" err="1" smtClean="0">
+                <a:latin typeface="Stone Serif" pitchFamily="2" charset="0"/>
+              </a:rPr>
+              <a:t>SI,et</a:t>
+            </a:r>
+            <a:r>
+              <a:rPr lang="fr-FR" sz="800" dirty="0" smtClean="0">
+                <a:latin typeface="Stone Serif" pitchFamily="2" charset="0"/>
+              </a:rPr>
+              <a:t> d’une DSI sont très </a:t>
+            </a:r>
+            <a:r>
+              <a:rPr lang="fr-FR" sz="800" dirty="0" smtClean="0">
+                <a:latin typeface="Stone Serif" pitchFamily="2" charset="0"/>
+              </a:rPr>
+              <a:t>élevés.</a:t>
             </a:r>
             <a:endParaRPr lang="fr-FR" sz="800" dirty="0">
               <a:latin typeface="Stone Serif" pitchFamily="2" charset="0"/>
@@ -13459,18 +13555,13 @@
               <a:rPr lang="fr-FR" sz="800" dirty="0" smtClean="0">
                 <a:latin typeface="Stone Serif" pitchFamily="2" charset="0"/>
               </a:rPr>
-              <a:t>- des SI fiables et une DSI modernisée</a:t>
-            </a:r>
-            <a:br>
+              <a:t>- </a:t>
+            </a:r>
+            <a:r>
               <a:rPr lang="fr-FR" sz="800" dirty="0" smtClean="0">
                 <a:latin typeface="Stone Serif" pitchFamily="2" charset="0"/>
               </a:rPr>
-            </a:br>
-            <a:r>
-              <a:rPr lang="fr-FR" sz="800" dirty="0" smtClean="0">
-                <a:latin typeface="Stone Serif" pitchFamily="2" charset="0"/>
-              </a:rPr>
-              <a:t>- un leadership capable de prendre des décisions d’investissements forts sur le SI.</a:t>
+              <a:t>un leadership capable de prendre des décisions d’investissements forts sur le SI.</a:t>
             </a:r>
             <a:br>
               <a:rPr lang="fr-FR" sz="800" dirty="0" smtClean="0">
@@ -17793,7 +17884,7 @@
               <a:rPr lang="fr-FR" sz="700" dirty="0" smtClean="0">
                 <a:latin typeface="Stone Serif" pitchFamily="2" charset="0"/>
               </a:rPr>
-              <a:t>- manque de suivi juridique sur la chaîne de traitement des données.</a:t>
+              <a:t>- manque de suivi technique et juridique sur la chaîne de traitement des données.</a:t>
             </a:r>
           </a:p>
         </p:txBody>
@@ -18010,20 +18101,30 @@
               <a:rPr lang="fr-FR" sz="700" dirty="0" smtClean="0">
                 <a:latin typeface="Stone Serif" pitchFamily="2" charset="0"/>
               </a:rPr>
-              <a:t>- savoir être consommateur de services cloud mais également </a:t>
-            </a:r>
-            <a:r>
-              <a:rPr lang="fr-FR" sz="700" u="sng" dirty="0" smtClean="0">
-                <a:latin typeface="Stone Serif" pitchFamily="2" charset="0"/>
-              </a:rPr>
-              <a:t>fournisseur</a:t>
+              <a:t>- Identifier </a:t>
+            </a:r>
+            <a:r>
+              <a:rPr lang="fr-FR" sz="700" dirty="0">
+                <a:latin typeface="Stone Serif" pitchFamily="2" charset="0"/>
+              </a:rPr>
+              <a:t>les cas d’usage et les gains métiers et </a:t>
             </a:r>
             <a:r>
               <a:rPr lang="fr-FR" sz="700" dirty="0" smtClean="0">
                 <a:latin typeface="Stone Serif" pitchFamily="2" charset="0"/>
               </a:rPr>
-              <a:t> : quelle partie de votre activité est susceptible d’être offerte en mode « as a service » ?</a:t>
-            </a:r>
+              <a:t>coûts associés</a:t>
+            </a:r>
+            <a:endParaRPr lang="fr-FR" sz="700" dirty="0">
+              <a:latin typeface="Stone Serif" pitchFamily="2" charset="0"/>
+            </a:endParaRPr>
+          </a:p>
+          <a:p>
+            <a:pPr algn="l">
+              <a:lnSpc>
+                <a:spcPct val="135000"/>
+              </a:lnSpc>
+            </a:pPr>
             <a:endParaRPr lang="fr-FR" sz="700" u="sng" dirty="0" smtClean="0">
               <a:latin typeface="Stone Serif" pitchFamily="2" charset="0"/>
             </a:endParaRPr>
@@ -18243,7 +18344,7 @@
               <a:rPr lang="fr-FR" sz="800" dirty="0" smtClean="0">
                 <a:latin typeface="Stone Serif" pitchFamily="2" charset="0"/>
               </a:rPr>
-              <a:t>, Microsoft Azure, Amazon EC2, Google Cloud</a:t>
+              <a:t>, Microsoft Azure, AWS, Google Cloud</a:t>
             </a:r>
             <a:endParaRPr lang="fr-FR" sz="800" dirty="0">
               <a:latin typeface="Stone Serif" pitchFamily="2" charset="0"/>
@@ -18387,17 +18488,20 @@
               <a:t>nouveaux clients, nouveaux marchés, nouveaux business </a:t>
             </a:r>
             <a:r>
-              <a:rPr lang="fr-FR" sz="800" dirty="0" err="1">
+              <a:rPr lang="fr-FR" sz="800" dirty="0" err="1" smtClean="0">
                 <a:latin typeface="Stone Serif" pitchFamily="2" charset="0"/>
               </a:rPr>
               <a:t>models</a:t>
             </a:r>
             <a:r>
-              <a:rPr lang="fr-FR" sz="800" dirty="0">
-                <a:latin typeface="Stone Serif" pitchFamily="2" charset="0"/>
-              </a:rPr>
-              <a:t>.</a:t>
-            </a:r>
+              <a:rPr lang="fr-FR" sz="800" dirty="0" smtClean="0">
+                <a:latin typeface="Stone Serif" pitchFamily="2" charset="0"/>
+              </a:rPr>
+              <a:t>, souplesse et rapidité de la mise en œuvre.</a:t>
+            </a:r>
+            <a:endParaRPr lang="fr-FR" sz="800" dirty="0">
+              <a:latin typeface="Stone Serif" pitchFamily="2" charset="0"/>
+            </a:endParaRPr>
           </a:p>
         </p:txBody>
       </p:sp>
@@ -20713,7 +20817,7 @@
               <a:rPr lang="fr-FR" sz="700" dirty="0" smtClean="0">
                 <a:latin typeface="Stone Serif" pitchFamily="2" charset="0"/>
               </a:rPr>
-              <a:t> permanents de recensement des données et de leurs usages, idéalement de paire avec la mission sur la qualité des données.</a:t>
+              <a:t> permanents de recensement des données et de leurs usages, idéalement de paire avec la mission sur la qualité des données (« gouvernance »).</a:t>
             </a:r>
           </a:p>
           <a:p>
@@ -21024,7 +21128,7 @@
               <a:rPr lang="fr-FR" sz="800" dirty="0" smtClean="0">
                 <a:latin typeface="Stone Serif" pitchFamily="2" charset="0"/>
               </a:rPr>
-              <a:t>Audit et mise en conformité « préemptive » : le RPGD oblige à un contrôle interne pour recenser les données effectivement collectées et leurs usages. C’est une rationalisation bénéfique sur ce terrain, laissé longtemps en friche.</a:t>
+              <a:t>Audit et mise en conformité « préemptive » : le RPGD oblige à établir un contrôle interne pour recenser les données collectées et leurs usages. C’est une rationalisation bénéfique sur ce terrain, laissé longtemps en friche.</a:t>
             </a:r>
             <a:endParaRPr lang="fr-FR" sz="800" dirty="0">
               <a:latin typeface="Stone Serif" pitchFamily="2" charset="0"/>
@@ -24224,7 +24328,7 @@
               <a:rPr lang="fr-FR" sz="700" dirty="0" smtClean="0">
                 <a:latin typeface="Stone Serif" pitchFamily="2" charset="0"/>
               </a:rPr>
-              <a:t> impacte les objets de consommation courante (accessoires, électroménager, etc.) mais également l’industrie (machines connectées, robotique, maintenance prédictive, etc.)</a:t>
+              <a:t> impacte les objets de consommation courante (accessoires, électroménager, etc.) mais également l’industrie et les services (machines connectées, robotique, etc.)</a:t>
             </a:r>
           </a:p>
         </p:txBody>
@@ -25949,10 +26053,16 @@
               </a:lnSpc>
             </a:pPr>
             <a:r>
+              <a:rPr lang="fr-FR" sz="800" dirty="0" err="1" smtClean="0">
+                <a:latin typeface="Stone Serif" pitchFamily="2" charset="0"/>
+              </a:rPr>
+              <a:t>Enedis</a:t>
+            </a:r>
+            <a:r>
               <a:rPr lang="fr-FR" sz="800" dirty="0" smtClean="0">
                 <a:latin typeface="Stone Serif" pitchFamily="2" charset="0"/>
               </a:rPr>
-              <a:t>Edf– avec </a:t>
+              <a:t>– avec </a:t>
             </a:r>
             <a:r>
               <a:rPr lang="fr-FR" sz="800" b="1" dirty="0" err="1" smtClean="0">
@@ -25970,7 +26080,7 @@
               <a:rPr lang="fr-FR" sz="800" dirty="0" smtClean="0">
                 <a:latin typeface="Stone Serif" pitchFamily="2" charset="0"/>
               </a:rPr>
-              <a:t>un compteur connecté qui fait un relevé horaire de consommation. Cela permettrait de moduler le prix en fonction de la consommation instantanée.</a:t>
+              <a:t>un compteur connecté qui fait un relevé horaire de consommation. Cela permettrait de moduler le prix et d’offrir des services en fonction de la consommation.</a:t>
             </a:r>
             <a:endParaRPr lang="fr-FR" sz="800" b="1" dirty="0">
               <a:latin typeface="Stone Serif" pitchFamily="2" charset="0"/>
@@ -26330,16 +26440,34 @@
               <a:t>, </a:t>
             </a:r>
             <a:r>
-              <a:rPr lang="fr-FR" sz="800" dirty="0" err="1">
+              <a:rPr lang="fr-FR" sz="800" dirty="0" err="1" smtClean="0">
                 <a:latin typeface="Stone Serif" pitchFamily="2" charset="0"/>
               </a:rPr>
               <a:t>Datalyo</a:t>
             </a:r>
             <a:r>
+              <a:rPr lang="fr-FR" sz="800" dirty="0" smtClean="0">
+                <a:latin typeface="Stone Serif" pitchFamily="2" charset="0"/>
+              </a:rPr>
+              <a:t>, </a:t>
+            </a:r>
+            <a:r>
+              <a:rPr lang="fr-FR" sz="800" dirty="0" err="1" smtClean="0">
+                <a:latin typeface="Stone Serif" pitchFamily="2" charset="0"/>
+              </a:rPr>
+              <a:t>Sicara</a:t>
+            </a:r>
+            <a:r>
+              <a:rPr lang="fr-FR" sz="800" dirty="0" smtClean="0">
+                <a:latin typeface="Stone Serif" pitchFamily="2" charset="0"/>
+              </a:rPr>
+              <a:t> </a:t>
+            </a:r>
+            <a:r>
               <a:rPr lang="fr-FR" sz="800" dirty="0">
                 <a:latin typeface="Stone Serif" pitchFamily="2" charset="0"/>
               </a:rPr>
-              <a:t> + </a:t>
+              <a:t>+ </a:t>
             </a:r>
             <a:r>
               <a:rPr lang="fr-FR" sz="800" dirty="0" smtClean="0">
@@ -26458,7 +26586,25 @@
               <a:rPr lang="fr-FR" sz="750" dirty="0">
                 <a:latin typeface="Stone Serif" pitchFamily="2" charset="0"/>
               </a:rPr>
-              <a:t> : là où un humain serait lent et commettrait des erreurs, le ML peut analyser des données complexes rapidement pour arriver à un jugement très fiable (dossier frauduleux ou pas ? Prix trop élevé ou correct ? Malade ou bien portant ?).</a:t>
+              <a:t> </a:t>
+            </a:r>
+            <a:r>
+              <a:rPr lang="fr-FR" sz="750" b="1" dirty="0" smtClean="0">
+                <a:latin typeface="Stone Serif" pitchFamily="2" charset="0"/>
+              </a:rPr>
+              <a:t>/ recommandations</a:t>
+            </a:r>
+            <a:r>
+              <a:rPr lang="fr-FR" sz="750" dirty="0" smtClean="0">
+                <a:latin typeface="Stone Serif" pitchFamily="2" charset="0"/>
+              </a:rPr>
+              <a:t> : </a:t>
+            </a:r>
+            <a:r>
+              <a:rPr lang="fr-FR" sz="750" dirty="0">
+                <a:latin typeface="Stone Serif" pitchFamily="2" charset="0"/>
+              </a:rPr>
+              <a:t>là où un humain serait lent et commettrait des erreurs, le ML peut analyser des données complexes rapidement pour arriver à un jugement très fiable (dossier frauduleux ou pas ? Prix trop élevé ou correct ? Malade ou bien portant ?).</a:t>
             </a:r>
           </a:p>
           <a:p>
@@ -27964,7 +28110,31 @@
               <a:rPr lang="fr-FR" sz="800" dirty="0" smtClean="0">
                 <a:latin typeface="Stone Serif" pitchFamily="2" charset="0"/>
               </a:rPr>
-              <a:t>, Stat4Decision + labos de recherche.</a:t>
+              <a:t>, Stat4Decision</a:t>
+            </a:r>
+            <a:r>
+              <a:rPr lang="fr-FR" sz="800" dirty="0">
+                <a:latin typeface="Stone Serif" pitchFamily="2" charset="0"/>
+              </a:rPr>
+              <a:t>, </a:t>
+            </a:r>
+            <a:r>
+              <a:rPr lang="fr-FR" sz="800" dirty="0" err="1">
+                <a:latin typeface="Stone Serif" pitchFamily="2" charset="0"/>
+              </a:rPr>
+              <a:t>Doyoudreamup</a:t>
+            </a:r>
+            <a:r>
+              <a:rPr lang="fr-FR" sz="800" dirty="0">
+                <a:latin typeface="Stone Serif" pitchFamily="2" charset="0"/>
+              </a:rPr>
+              <a:t>  </a:t>
+            </a:r>
+            <a:r>
+              <a:rPr lang="fr-FR" sz="800" dirty="0" smtClean="0">
+                <a:latin typeface="Stone Serif" pitchFamily="2" charset="0"/>
+              </a:rPr>
+              <a:t>+ labos de recherche.</a:t>
             </a:r>
             <a:endParaRPr lang="fr-FR" sz="800" dirty="0">
               <a:latin typeface="Stone Serif" pitchFamily="2" charset="0"/>

</xml_diff>